<commit_message>
refined the conceptual map
</commit_message>
<xml_diff>
--- a/class plans/class-plan-canvas-purrr.pptx
+++ b/class plans/class-plan-canvas-purrr.pptx
@@ -254,7 +254,7 @@
           <a:p>
             <a:fld id="{AB7FA1D5-CF2C-4DA9-9DBA-000C3BF73F50}" type="datetimeFigureOut">
               <a:rPr lang="en-IL" smtClean="0"/>
-              <a:t>11/06/2019</a:t>
+              <a:t>12/06/2019</a:t>
             </a:fld>
             <a:endParaRPr lang="en-IL"/>
           </a:p>
@@ -424,7 +424,7 @@
           <a:p>
             <a:fld id="{AB7FA1D5-CF2C-4DA9-9DBA-000C3BF73F50}" type="datetimeFigureOut">
               <a:rPr lang="en-IL" smtClean="0"/>
-              <a:t>11/06/2019</a:t>
+              <a:t>12/06/2019</a:t>
             </a:fld>
             <a:endParaRPr lang="en-IL"/>
           </a:p>
@@ -604,7 +604,7 @@
           <a:p>
             <a:fld id="{AB7FA1D5-CF2C-4DA9-9DBA-000C3BF73F50}" type="datetimeFigureOut">
               <a:rPr lang="en-IL" smtClean="0"/>
-              <a:t>11/06/2019</a:t>
+              <a:t>12/06/2019</a:t>
             </a:fld>
             <a:endParaRPr lang="en-IL"/>
           </a:p>
@@ -774,7 +774,7 @@
           <a:p>
             <a:fld id="{AB7FA1D5-CF2C-4DA9-9DBA-000C3BF73F50}" type="datetimeFigureOut">
               <a:rPr lang="en-IL" smtClean="0"/>
-              <a:t>11/06/2019</a:t>
+              <a:t>12/06/2019</a:t>
             </a:fld>
             <a:endParaRPr lang="en-IL"/>
           </a:p>
@@ -1018,7 +1018,7 @@
           <a:p>
             <a:fld id="{AB7FA1D5-CF2C-4DA9-9DBA-000C3BF73F50}" type="datetimeFigureOut">
               <a:rPr lang="en-IL" smtClean="0"/>
-              <a:t>11/06/2019</a:t>
+              <a:t>12/06/2019</a:t>
             </a:fld>
             <a:endParaRPr lang="en-IL"/>
           </a:p>
@@ -1250,7 +1250,7 @@
           <a:p>
             <a:fld id="{AB7FA1D5-CF2C-4DA9-9DBA-000C3BF73F50}" type="datetimeFigureOut">
               <a:rPr lang="en-IL" smtClean="0"/>
-              <a:t>11/06/2019</a:t>
+              <a:t>12/06/2019</a:t>
             </a:fld>
             <a:endParaRPr lang="en-IL"/>
           </a:p>
@@ -1617,7 +1617,7 @@
           <a:p>
             <a:fld id="{AB7FA1D5-CF2C-4DA9-9DBA-000C3BF73F50}" type="datetimeFigureOut">
               <a:rPr lang="en-IL" smtClean="0"/>
-              <a:t>11/06/2019</a:t>
+              <a:t>12/06/2019</a:t>
             </a:fld>
             <a:endParaRPr lang="en-IL"/>
           </a:p>
@@ -1735,7 +1735,7 @@
           <a:p>
             <a:fld id="{AB7FA1D5-CF2C-4DA9-9DBA-000C3BF73F50}" type="datetimeFigureOut">
               <a:rPr lang="en-IL" smtClean="0"/>
-              <a:t>11/06/2019</a:t>
+              <a:t>12/06/2019</a:t>
             </a:fld>
             <a:endParaRPr lang="en-IL"/>
           </a:p>
@@ -1830,7 +1830,7 @@
           <a:p>
             <a:fld id="{AB7FA1D5-CF2C-4DA9-9DBA-000C3BF73F50}" type="datetimeFigureOut">
               <a:rPr lang="en-IL" smtClean="0"/>
-              <a:t>11/06/2019</a:t>
+              <a:t>12/06/2019</a:t>
             </a:fld>
             <a:endParaRPr lang="en-IL"/>
           </a:p>
@@ -2107,7 +2107,7 @@
           <a:p>
             <a:fld id="{AB7FA1D5-CF2C-4DA9-9DBA-000C3BF73F50}" type="datetimeFigureOut">
               <a:rPr lang="en-IL" smtClean="0"/>
-              <a:t>11/06/2019</a:t>
+              <a:t>12/06/2019</a:t>
             </a:fld>
             <a:endParaRPr lang="en-IL"/>
           </a:p>
@@ -2364,7 +2364,7 @@
           <a:p>
             <a:fld id="{AB7FA1D5-CF2C-4DA9-9DBA-000C3BF73F50}" type="datetimeFigureOut">
               <a:rPr lang="en-IL" smtClean="0"/>
-              <a:t>11/06/2019</a:t>
+              <a:t>12/06/2019</a:t>
             </a:fld>
             <a:endParaRPr lang="en-IL"/>
           </a:p>
@@ -2577,7 +2577,7 @@
           <a:p>
             <a:fld id="{AB7FA1D5-CF2C-4DA9-9DBA-000C3BF73F50}" type="datetimeFigureOut">
               <a:rPr lang="en-IL" smtClean="0"/>
-              <a:t>11/06/2019</a:t>
+              <a:t>12/06/2019</a:t>
             </a:fld>
             <a:endParaRPr lang="en-IL"/>
           </a:p>
@@ -3600,7 +3600,7 @@
           </a:ln>
           <a:extLst>
             <a:ext uri="{C572A759-6A51-4108-AA02-DFA0A04FC94B}">
-              <ma14:wrappingTextBoxFlag xmlns="" xmlns:m="http://schemas.openxmlformats.org/officeDocument/2006/math" xmlns:a14="http://schemas.microsoft.com/office/drawing/2010/main" xmlns:ma14="http://schemas.microsoft.com/office/mac/drawingml/2011/main" val="1"/>
+              <ma14:wrappingTextBoxFlag xmlns:ma14="http://schemas.microsoft.com/office/mac/drawingml/2011/main" xmlns:a14="http://schemas.microsoft.com/office/drawing/2010/main" xmlns:m="http://schemas.openxmlformats.org/officeDocument/2006/math" xmlns="" val="1"/>
             </a:ext>
           </a:extLst>
         </p:spPr>
@@ -3903,844 +3903,783 @@
           </a:p>
         </p:txBody>
       </p:sp>
-      <p:grpSp>
-        <p:nvGrpSpPr>
-          <p:cNvPr id="29" name="Group 28">
+      <p:sp>
+        <p:nvSpPr>
+          <p:cNvPr id="31" name="Rectangle: Rounded Corners 30">
             <a:extLst>
               <a:ext uri="{FF2B5EF4-FFF2-40B4-BE49-F238E27FC236}">
-                <a16:creationId xmlns:a16="http://schemas.microsoft.com/office/drawing/2014/main" id="{D4B2581E-48FA-409F-AD7C-4658757787F3}"/>
+                <a16:creationId xmlns:a16="http://schemas.microsoft.com/office/drawing/2014/main" id="{B4FA0671-6DB8-4050-9D31-9FA0BFC0D4D5}"/>
               </a:ext>
             </a:extLst>
           </p:cNvPr>
-          <p:cNvGrpSpPr/>
+          <p:cNvSpPr/>
           <p:nvPr/>
-        </p:nvGrpSpPr>
-        <p:grpSpPr>
-          <a:xfrm>
-            <a:off x="4270762" y="1066172"/>
-            <a:ext cx="5135125" cy="2303480"/>
-            <a:chOff x="1858992" y="1944697"/>
-            <a:chExt cx="9137985" cy="4099056"/>
-          </a:xfrm>
-        </p:grpSpPr>
-        <p:sp>
-          <p:nvSpPr>
-            <p:cNvPr id="31" name="Rectangle: Rounded Corners 30">
-              <a:extLst>
-                <a:ext uri="{FF2B5EF4-FFF2-40B4-BE49-F238E27FC236}">
-                  <a16:creationId xmlns:a16="http://schemas.microsoft.com/office/drawing/2014/main" id="{B4FA0671-6DB8-4050-9D31-9FA0BFC0D4D5}"/>
-                </a:ext>
-              </a:extLst>
-            </p:cNvPr>
-            <p:cNvSpPr/>
-            <p:nvPr/>
-          </p:nvSpPr>
-          <p:spPr>
-            <a:xfrm>
-              <a:off x="1858992" y="2246061"/>
-              <a:ext cx="1365849" cy="615408"/>
-            </a:xfrm>
-            <a:prstGeom prst="roundRect">
-              <a:avLst/>
-            </a:prstGeom>
-          </p:spPr>
-          <p:style>
-            <a:lnRef idx="2">
-              <a:schemeClr val="accent5">
-                <a:shade val="50000"/>
-              </a:schemeClr>
-            </a:lnRef>
-            <a:fillRef idx="1">
-              <a:schemeClr val="accent5"/>
-            </a:fillRef>
-            <a:effectRef idx="0">
-              <a:schemeClr val="accent5"/>
-            </a:effectRef>
-            <a:fontRef idx="minor">
-              <a:schemeClr val="lt1"/>
-            </a:fontRef>
-          </p:style>
-          <p:txBody>
-            <a:bodyPr rtlCol="0" anchor="ctr"/>
-            <a:lstStyle/>
-            <a:p>
-              <a:pPr algn="ctr"/>
-              <a:r>
-                <a:rPr lang="en-US" sz="1200" dirty="0"/>
-                <a:t>map</a:t>
-              </a:r>
-              <a:endParaRPr lang="en-IL" sz="1200" dirty="0"/>
-            </a:p>
-          </p:txBody>
-        </p:sp>
-        <p:sp>
-          <p:nvSpPr>
-            <p:cNvPr id="32" name="Rectangle: Rounded Corners 31">
-              <a:extLst>
-                <a:ext uri="{FF2B5EF4-FFF2-40B4-BE49-F238E27FC236}">
-                  <a16:creationId xmlns:a16="http://schemas.microsoft.com/office/drawing/2014/main" id="{7D780352-89A4-4749-AD63-966654D4055F}"/>
-                </a:ext>
-              </a:extLst>
-            </p:cNvPr>
-            <p:cNvSpPr/>
-            <p:nvPr/>
-          </p:nvSpPr>
-          <p:spPr>
-            <a:xfrm>
-              <a:off x="1858992" y="3091880"/>
-              <a:ext cx="1365849" cy="615408"/>
-            </a:xfrm>
-            <a:prstGeom prst="roundRect">
-              <a:avLst/>
-            </a:prstGeom>
-          </p:spPr>
-          <p:style>
-            <a:lnRef idx="2">
-              <a:schemeClr val="accent5">
-                <a:shade val="50000"/>
-              </a:schemeClr>
-            </a:lnRef>
-            <a:fillRef idx="1">
-              <a:schemeClr val="accent5"/>
-            </a:fillRef>
-            <a:effectRef idx="0">
-              <a:schemeClr val="accent5"/>
-            </a:effectRef>
-            <a:fontRef idx="minor">
-              <a:schemeClr val="lt1"/>
-            </a:fontRef>
-          </p:style>
-          <p:txBody>
-            <a:bodyPr rtlCol="0" anchor="ctr"/>
-            <a:lstStyle/>
-            <a:p>
-              <a:pPr algn="ctr"/>
-              <a:r>
-                <a:rPr lang="en-US" sz="1200" dirty="0"/>
-                <a:t>map2</a:t>
-              </a:r>
-              <a:endParaRPr lang="en-IL" sz="1200" dirty="0"/>
-            </a:p>
-          </p:txBody>
-        </p:sp>
-        <p:sp>
-          <p:nvSpPr>
-            <p:cNvPr id="33" name="Rectangle: Rounded Corners 32">
-              <a:extLst>
-                <a:ext uri="{FF2B5EF4-FFF2-40B4-BE49-F238E27FC236}">
-                  <a16:creationId xmlns:a16="http://schemas.microsoft.com/office/drawing/2014/main" id="{19F25F2B-41B8-4B2E-AAE2-18AE915FE653}"/>
-                </a:ext>
-              </a:extLst>
-            </p:cNvPr>
-            <p:cNvSpPr/>
-            <p:nvPr/>
-          </p:nvSpPr>
-          <p:spPr>
-            <a:xfrm>
-              <a:off x="1858992" y="3942531"/>
-              <a:ext cx="1365849" cy="615408"/>
-            </a:xfrm>
-            <a:prstGeom prst="roundRect">
-              <a:avLst/>
-            </a:prstGeom>
-          </p:spPr>
-          <p:style>
-            <a:lnRef idx="2">
-              <a:schemeClr val="accent5">
-                <a:shade val="50000"/>
-              </a:schemeClr>
-            </a:lnRef>
-            <a:fillRef idx="1">
-              <a:schemeClr val="accent5"/>
-            </a:fillRef>
-            <a:effectRef idx="0">
-              <a:schemeClr val="accent5"/>
-            </a:effectRef>
-            <a:fontRef idx="minor">
-              <a:schemeClr val="lt1"/>
-            </a:fontRef>
-          </p:style>
-          <p:txBody>
-            <a:bodyPr rtlCol="0" anchor="ctr"/>
-            <a:lstStyle/>
-            <a:p>
-              <a:pPr algn="ctr"/>
-              <a:r>
-                <a:rPr lang="en-US" sz="1200" dirty="0" err="1"/>
-                <a:t>pmap</a:t>
-              </a:r>
-              <a:endParaRPr lang="en-IL" sz="1200" dirty="0"/>
-            </a:p>
-          </p:txBody>
-        </p:sp>
-        <p:sp>
-          <p:nvSpPr>
-            <p:cNvPr id="34" name="Rectangle: Rounded Corners 33">
-              <a:extLst>
-                <a:ext uri="{FF2B5EF4-FFF2-40B4-BE49-F238E27FC236}">
-                  <a16:creationId xmlns:a16="http://schemas.microsoft.com/office/drawing/2014/main" id="{2AF4D988-951A-499E-9505-60B15F02E7EE}"/>
-                </a:ext>
-              </a:extLst>
-            </p:cNvPr>
-            <p:cNvSpPr/>
-            <p:nvPr/>
-          </p:nvSpPr>
-          <p:spPr>
-            <a:xfrm>
-              <a:off x="7976558" y="2092510"/>
-              <a:ext cx="1365849" cy="615408"/>
-            </a:xfrm>
-            <a:prstGeom prst="roundRect">
-              <a:avLst/>
-            </a:prstGeom>
-          </p:spPr>
-          <p:style>
-            <a:lnRef idx="2">
-              <a:schemeClr val="accent2">
-                <a:shade val="50000"/>
-              </a:schemeClr>
-            </a:lnRef>
-            <a:fillRef idx="1">
-              <a:schemeClr val="accent2"/>
-            </a:fillRef>
-            <a:effectRef idx="0">
-              <a:schemeClr val="accent2"/>
-            </a:effectRef>
-            <a:fontRef idx="minor">
-              <a:schemeClr val="lt1"/>
-            </a:fontRef>
-          </p:style>
-          <p:txBody>
-            <a:bodyPr rtlCol="0" anchor="ctr"/>
-            <a:lstStyle/>
-            <a:p>
-              <a:pPr algn="ctr"/>
-              <a:r>
-                <a:rPr lang="en-US" sz="1200" dirty="0" err="1"/>
-                <a:t>map_chr</a:t>
-              </a:r>
-              <a:endParaRPr lang="en-IL" sz="1200" dirty="0"/>
-            </a:p>
-          </p:txBody>
-        </p:sp>
-        <p:sp>
-          <p:nvSpPr>
-            <p:cNvPr id="35" name="Rectangle: Rounded Corners 34">
-              <a:extLst>
-                <a:ext uri="{FF2B5EF4-FFF2-40B4-BE49-F238E27FC236}">
-                  <a16:creationId xmlns:a16="http://schemas.microsoft.com/office/drawing/2014/main" id="{B8B70F72-CC19-4CBC-915F-A451227E6F2A}"/>
-                </a:ext>
-              </a:extLst>
-            </p:cNvPr>
-            <p:cNvSpPr/>
-            <p:nvPr/>
-          </p:nvSpPr>
-          <p:spPr>
-            <a:xfrm>
-              <a:off x="7976558" y="2828602"/>
-              <a:ext cx="1365849" cy="615408"/>
-            </a:xfrm>
-            <a:prstGeom prst="roundRect">
-              <a:avLst/>
-            </a:prstGeom>
-          </p:spPr>
-          <p:style>
-            <a:lnRef idx="2">
-              <a:schemeClr val="accent2">
-                <a:shade val="50000"/>
-              </a:schemeClr>
-            </a:lnRef>
-            <a:fillRef idx="1">
-              <a:schemeClr val="accent2"/>
-            </a:fillRef>
-            <a:effectRef idx="0">
-              <a:schemeClr val="accent2"/>
-            </a:effectRef>
-            <a:fontRef idx="minor">
-              <a:schemeClr val="lt1"/>
-            </a:fontRef>
-          </p:style>
-          <p:txBody>
-            <a:bodyPr rtlCol="0" anchor="ctr"/>
-            <a:lstStyle/>
-            <a:p>
-              <a:pPr algn="ctr"/>
-              <a:r>
-                <a:rPr lang="en-US" sz="1200" dirty="0" err="1"/>
-                <a:t>map_dbl</a:t>
-              </a:r>
-              <a:endParaRPr lang="en-IL" sz="1200" dirty="0"/>
-            </a:p>
-          </p:txBody>
-        </p:sp>
-        <p:sp>
-          <p:nvSpPr>
-            <p:cNvPr id="37" name="Rectangle: Rounded Corners 36">
-              <a:extLst>
-                <a:ext uri="{FF2B5EF4-FFF2-40B4-BE49-F238E27FC236}">
-                  <a16:creationId xmlns:a16="http://schemas.microsoft.com/office/drawing/2014/main" id="{DC6ACE62-516D-44D9-892A-541E3AC22F3F}"/>
-                </a:ext>
-              </a:extLst>
-            </p:cNvPr>
-            <p:cNvSpPr/>
-            <p:nvPr/>
-          </p:nvSpPr>
-          <p:spPr>
-            <a:xfrm>
-              <a:off x="9606950" y="2828602"/>
-              <a:ext cx="1365849" cy="615408"/>
-            </a:xfrm>
-            <a:prstGeom prst="roundRect">
-              <a:avLst/>
-            </a:prstGeom>
-          </p:spPr>
-          <p:style>
-            <a:lnRef idx="2">
-              <a:schemeClr val="accent2">
-                <a:shade val="50000"/>
-              </a:schemeClr>
-            </a:lnRef>
-            <a:fillRef idx="1">
-              <a:schemeClr val="accent2"/>
-            </a:fillRef>
-            <a:effectRef idx="0">
-              <a:schemeClr val="accent2"/>
-            </a:effectRef>
-            <a:fontRef idx="minor">
-              <a:schemeClr val="lt1"/>
-            </a:fontRef>
-          </p:style>
-          <p:txBody>
-            <a:bodyPr rtlCol="0" anchor="ctr"/>
-            <a:lstStyle/>
-            <a:p>
-              <a:pPr algn="ctr"/>
-              <a:r>
-                <a:rPr lang="en-US" sz="1200" dirty="0" err="1"/>
-                <a:t>map_int</a:t>
-              </a:r>
-              <a:endParaRPr lang="en-IL" sz="1200" dirty="0"/>
-            </a:p>
-          </p:txBody>
-        </p:sp>
-        <p:sp>
-          <p:nvSpPr>
-            <p:cNvPr id="40" name="Rectangle: Rounded Corners 39">
-              <a:extLst>
-                <a:ext uri="{FF2B5EF4-FFF2-40B4-BE49-F238E27FC236}">
-                  <a16:creationId xmlns:a16="http://schemas.microsoft.com/office/drawing/2014/main" id="{A9DD05EE-86D7-4B9B-B66B-18EAFD63A683}"/>
-                </a:ext>
-              </a:extLst>
-            </p:cNvPr>
-            <p:cNvSpPr/>
-            <p:nvPr/>
-          </p:nvSpPr>
-          <p:spPr>
-            <a:xfrm>
-              <a:off x="7976558" y="3550738"/>
-              <a:ext cx="1365849" cy="615408"/>
-            </a:xfrm>
-            <a:prstGeom prst="roundRect">
-              <a:avLst/>
-            </a:prstGeom>
-          </p:spPr>
-          <p:style>
-            <a:lnRef idx="2">
-              <a:schemeClr val="accent2">
-                <a:shade val="50000"/>
-              </a:schemeClr>
-            </a:lnRef>
-            <a:fillRef idx="1">
-              <a:schemeClr val="accent2"/>
-            </a:fillRef>
-            <a:effectRef idx="0">
-              <a:schemeClr val="accent2"/>
-            </a:effectRef>
-            <a:fontRef idx="minor">
-              <a:schemeClr val="lt1"/>
-            </a:fontRef>
-          </p:style>
-          <p:txBody>
-            <a:bodyPr rtlCol="0" anchor="ctr"/>
-            <a:lstStyle/>
-            <a:p>
-              <a:pPr algn="ctr"/>
-              <a:r>
-                <a:rPr lang="en-US" sz="1200" dirty="0" err="1"/>
-                <a:t>map_lgl</a:t>
-              </a:r>
-              <a:endParaRPr lang="en-IL" sz="1200" dirty="0"/>
-            </a:p>
-          </p:txBody>
-        </p:sp>
-        <p:sp>
-          <p:nvSpPr>
-            <p:cNvPr id="41" name="Rectangle: Rounded Corners 40">
-              <a:extLst>
-                <a:ext uri="{FF2B5EF4-FFF2-40B4-BE49-F238E27FC236}">
-                  <a16:creationId xmlns:a16="http://schemas.microsoft.com/office/drawing/2014/main" id="{619F90B0-4E65-4EE5-994C-1D02907C8181}"/>
-                </a:ext>
-              </a:extLst>
-            </p:cNvPr>
-            <p:cNvSpPr/>
-            <p:nvPr/>
-          </p:nvSpPr>
-          <p:spPr>
-            <a:xfrm>
-              <a:off x="9631128" y="3544590"/>
-              <a:ext cx="1365849" cy="615408"/>
-            </a:xfrm>
-            <a:prstGeom prst="roundRect">
-              <a:avLst/>
-            </a:prstGeom>
-          </p:spPr>
-          <p:style>
-            <a:lnRef idx="2">
-              <a:schemeClr val="accent2">
-                <a:shade val="50000"/>
-              </a:schemeClr>
-            </a:lnRef>
-            <a:fillRef idx="1">
-              <a:schemeClr val="accent2"/>
-            </a:fillRef>
-            <a:effectRef idx="0">
-              <a:schemeClr val="accent2"/>
-            </a:effectRef>
-            <a:fontRef idx="minor">
-              <a:schemeClr val="lt1"/>
-            </a:fontRef>
-          </p:style>
-          <p:txBody>
-            <a:bodyPr rtlCol="0" anchor="ctr"/>
-            <a:lstStyle/>
-            <a:p>
-              <a:pPr algn="ctr"/>
-              <a:r>
-                <a:rPr lang="en-US" sz="1200" dirty="0" err="1"/>
-                <a:t>map_df</a:t>
-              </a:r>
-              <a:endParaRPr lang="en-IL" sz="1200" dirty="0"/>
-            </a:p>
-          </p:txBody>
-        </p:sp>
-        <p:sp>
-          <p:nvSpPr>
-            <p:cNvPr id="42" name="Rectangle: Rounded Corners 41">
-              <a:extLst>
-                <a:ext uri="{FF2B5EF4-FFF2-40B4-BE49-F238E27FC236}">
-                  <a16:creationId xmlns:a16="http://schemas.microsoft.com/office/drawing/2014/main" id="{4DFA2E1B-1F51-41D1-A551-DE96B50F9D1E}"/>
-                </a:ext>
-              </a:extLst>
-            </p:cNvPr>
-            <p:cNvSpPr/>
-            <p:nvPr/>
-          </p:nvSpPr>
-          <p:spPr>
-            <a:xfrm>
-              <a:off x="4293079" y="4628590"/>
-              <a:ext cx="1656272" cy="615408"/>
-            </a:xfrm>
-            <a:prstGeom prst="roundRect">
-              <a:avLst/>
-            </a:prstGeom>
-          </p:spPr>
-          <p:style>
-            <a:lnRef idx="2">
-              <a:schemeClr val="accent1">
-                <a:shade val="50000"/>
-              </a:schemeClr>
-            </a:lnRef>
-            <a:fillRef idx="1">
-              <a:schemeClr val="accent1"/>
-            </a:fillRef>
-            <a:effectRef idx="0">
-              <a:schemeClr val="accent1"/>
-            </a:effectRef>
-            <a:fontRef idx="minor">
-              <a:schemeClr val="lt1"/>
-            </a:fontRef>
-          </p:style>
-          <p:txBody>
-            <a:bodyPr rtlCol="0" anchor="ctr"/>
-            <a:lstStyle/>
-            <a:p>
-              <a:pPr algn="ctr"/>
-              <a:r>
-                <a:rPr lang="en-US" sz="1200" dirty="0"/>
-                <a:t>function(x) x</a:t>
-              </a:r>
-              <a:endParaRPr lang="en-IL" sz="1200" dirty="0"/>
-            </a:p>
-          </p:txBody>
-        </p:sp>
-        <p:sp>
-          <p:nvSpPr>
-            <p:cNvPr id="43" name="Rectangle: Rounded Corners 42">
-              <a:extLst>
-                <a:ext uri="{FF2B5EF4-FFF2-40B4-BE49-F238E27FC236}">
-                  <a16:creationId xmlns:a16="http://schemas.microsoft.com/office/drawing/2014/main" id="{94420D02-C9E3-4E43-BC92-DA1E115CE800}"/>
-                </a:ext>
-              </a:extLst>
-            </p:cNvPr>
-            <p:cNvSpPr/>
-            <p:nvPr/>
-          </p:nvSpPr>
-          <p:spPr>
-            <a:xfrm>
-              <a:off x="6157823" y="4628590"/>
-              <a:ext cx="888514" cy="615408"/>
-            </a:xfrm>
-            <a:prstGeom prst="roundRect">
-              <a:avLst/>
-            </a:prstGeom>
-          </p:spPr>
-          <p:style>
-            <a:lnRef idx="2">
-              <a:schemeClr val="accent1">
-                <a:shade val="50000"/>
-              </a:schemeClr>
-            </a:lnRef>
-            <a:fillRef idx="1">
-              <a:schemeClr val="accent1"/>
-            </a:fillRef>
-            <a:effectRef idx="0">
-              <a:schemeClr val="accent1"/>
-            </a:effectRef>
-            <a:fontRef idx="minor">
-              <a:schemeClr val="lt1"/>
-            </a:fontRef>
-          </p:style>
-          <p:txBody>
-            <a:bodyPr rtlCol="0" anchor="ctr"/>
-            <a:lstStyle/>
-            <a:p>
-              <a:pPr algn="ctr"/>
-              <a:r>
-                <a:rPr lang="en-US" sz="1200" dirty="0"/>
-                <a:t>~ .x</a:t>
-              </a:r>
-              <a:endParaRPr lang="en-IL" sz="1200" dirty="0"/>
-            </a:p>
-          </p:txBody>
-        </p:sp>
-        <p:sp>
-          <p:nvSpPr>
-            <p:cNvPr id="44" name="Rectangle: Rounded Corners 43">
-              <a:extLst>
-                <a:ext uri="{FF2B5EF4-FFF2-40B4-BE49-F238E27FC236}">
-                  <a16:creationId xmlns:a16="http://schemas.microsoft.com/office/drawing/2014/main" id="{E42EE89D-B566-4D81-9F3A-89F64B69398B}"/>
-                </a:ext>
-              </a:extLst>
-            </p:cNvPr>
-            <p:cNvSpPr/>
-            <p:nvPr/>
-          </p:nvSpPr>
-          <p:spPr>
-            <a:xfrm>
-              <a:off x="4293080" y="5428345"/>
-              <a:ext cx="2753234" cy="615408"/>
-            </a:xfrm>
-            <a:prstGeom prst="roundRect">
-              <a:avLst/>
-            </a:prstGeom>
-          </p:spPr>
-          <p:style>
-            <a:lnRef idx="2">
-              <a:schemeClr val="accent1">
-                <a:shade val="50000"/>
-              </a:schemeClr>
-            </a:lnRef>
-            <a:fillRef idx="1">
-              <a:schemeClr val="accent1"/>
-            </a:fillRef>
-            <a:effectRef idx="0">
-              <a:schemeClr val="accent1"/>
-            </a:effectRef>
-            <a:fontRef idx="minor">
-              <a:schemeClr val="lt1"/>
-            </a:fontRef>
-          </p:style>
-          <p:txBody>
-            <a:bodyPr rtlCol="0" anchor="ctr"/>
-            <a:lstStyle/>
-            <a:p>
-              <a:pPr algn="ctr"/>
-              <a:r>
-                <a:rPr lang="en-US" sz="1200" dirty="0" err="1"/>
-                <a:t>my_func</a:t>
-              </a:r>
-              <a:r>
-                <a:rPr lang="en-US" sz="1200" dirty="0"/>
-                <a:t> &lt;- function(x) {x}</a:t>
-              </a:r>
-              <a:endParaRPr lang="en-IL" sz="1200" dirty="0"/>
-            </a:p>
-          </p:txBody>
-        </p:sp>
-        <p:sp>
-          <p:nvSpPr>
-            <p:cNvPr id="45" name="Rectangle: Rounded Corners 44">
-              <a:extLst>
-                <a:ext uri="{FF2B5EF4-FFF2-40B4-BE49-F238E27FC236}">
-                  <a16:creationId xmlns:a16="http://schemas.microsoft.com/office/drawing/2014/main" id="{9591BCB6-B030-4FB3-8656-5F68610FCEC7}"/>
-                </a:ext>
-              </a:extLst>
-            </p:cNvPr>
-            <p:cNvSpPr/>
-            <p:nvPr/>
-          </p:nvSpPr>
-          <p:spPr>
-            <a:xfrm>
-              <a:off x="4947967" y="3131216"/>
-              <a:ext cx="1365849" cy="615408"/>
-            </a:xfrm>
-            <a:prstGeom prst="roundRect">
-              <a:avLst/>
-            </a:prstGeom>
-          </p:spPr>
-          <p:style>
-            <a:lnRef idx="2">
-              <a:schemeClr val="dk1">
-                <a:shade val="50000"/>
-              </a:schemeClr>
-            </a:lnRef>
-            <a:fillRef idx="1">
-              <a:schemeClr val="dk1"/>
-            </a:fillRef>
-            <a:effectRef idx="0">
-              <a:schemeClr val="dk1"/>
-            </a:effectRef>
-            <a:fontRef idx="minor">
-              <a:schemeClr val="lt1"/>
-            </a:fontRef>
-          </p:style>
-          <p:txBody>
-            <a:bodyPr rtlCol="0" anchor="ctr"/>
-            <a:lstStyle/>
-            <a:p>
-              <a:pPr algn="ctr"/>
-              <a:r>
-                <a:rPr lang="en-US" sz="1200" dirty="0" err="1"/>
-                <a:t>purrr</a:t>
-              </a:r>
-              <a:endParaRPr lang="en-IL" sz="1200" dirty="0"/>
-            </a:p>
-          </p:txBody>
-        </p:sp>
-        <p:cxnSp>
-          <p:nvCxnSpPr>
-            <p:cNvPr id="46" name="Straight Arrow Connector 45">
-              <a:extLst>
-                <a:ext uri="{FF2B5EF4-FFF2-40B4-BE49-F238E27FC236}">
-                  <a16:creationId xmlns:a16="http://schemas.microsoft.com/office/drawing/2014/main" id="{9E8CA312-DEB4-4423-93C5-585287C0C2F0}"/>
-                </a:ext>
-              </a:extLst>
-            </p:cNvPr>
-            <p:cNvCxnSpPr>
-              <a:stCxn id="45" idx="3"/>
-            </p:cNvCxnSpPr>
-            <p:nvPr/>
-          </p:nvCxnSpPr>
-          <p:spPr>
-            <a:xfrm flipV="1">
-              <a:off x="6313816" y="3414984"/>
-              <a:ext cx="1101968" cy="23936"/>
-            </a:xfrm>
-            <a:prstGeom prst="straightConnector1">
-              <a:avLst/>
-            </a:prstGeom>
-            <a:ln>
-              <a:tailEnd type="triangle"/>
-            </a:ln>
-          </p:spPr>
-          <p:style>
-            <a:lnRef idx="2">
-              <a:schemeClr val="dk1"/>
-            </a:lnRef>
-            <a:fillRef idx="0">
-              <a:schemeClr val="dk1"/>
-            </a:fillRef>
-            <a:effectRef idx="1">
-              <a:schemeClr val="dk1"/>
-            </a:effectRef>
-            <a:fontRef idx="minor">
-              <a:schemeClr val="tx1"/>
-            </a:fontRef>
-          </p:style>
-        </p:cxnSp>
-        <p:cxnSp>
-          <p:nvCxnSpPr>
-            <p:cNvPr id="47" name="Straight Arrow Connector 46">
-              <a:extLst>
-                <a:ext uri="{FF2B5EF4-FFF2-40B4-BE49-F238E27FC236}">
-                  <a16:creationId xmlns:a16="http://schemas.microsoft.com/office/drawing/2014/main" id="{32949EDF-A173-4DB6-B2D9-2ABD491F65CF}"/>
-                </a:ext>
-              </a:extLst>
-            </p:cNvPr>
-            <p:cNvCxnSpPr>
-              <a:stCxn id="45" idx="2"/>
-            </p:cNvCxnSpPr>
-            <p:nvPr/>
-          </p:nvCxnSpPr>
-          <p:spPr>
-            <a:xfrm flipH="1">
-              <a:off x="5630891" y="3746624"/>
-              <a:ext cx="1" cy="502425"/>
-            </a:xfrm>
-            <a:prstGeom prst="straightConnector1">
-              <a:avLst/>
-            </a:prstGeom>
-            <a:ln>
-              <a:tailEnd type="triangle"/>
-            </a:ln>
-          </p:spPr>
-          <p:style>
-            <a:lnRef idx="2">
-              <a:schemeClr val="dk1"/>
-            </a:lnRef>
-            <a:fillRef idx="0">
-              <a:schemeClr val="dk1"/>
-            </a:fillRef>
-            <a:effectRef idx="1">
-              <a:schemeClr val="dk1"/>
-            </a:effectRef>
-            <a:fontRef idx="minor">
-              <a:schemeClr val="tx1"/>
-            </a:fontRef>
-          </p:style>
-        </p:cxnSp>
-        <p:cxnSp>
-          <p:nvCxnSpPr>
-            <p:cNvPr id="48" name="Straight Arrow Connector 47">
-              <a:extLst>
-                <a:ext uri="{FF2B5EF4-FFF2-40B4-BE49-F238E27FC236}">
-                  <a16:creationId xmlns:a16="http://schemas.microsoft.com/office/drawing/2014/main" id="{A4E13822-0100-4325-88A2-6D243838F3BE}"/>
-                </a:ext>
-              </a:extLst>
-            </p:cNvPr>
-            <p:cNvCxnSpPr>
-              <a:stCxn id="45" idx="1"/>
-            </p:cNvCxnSpPr>
-            <p:nvPr/>
-          </p:nvCxnSpPr>
-          <p:spPr>
-            <a:xfrm flipH="1" flipV="1">
-              <a:off x="3838755" y="3429000"/>
-              <a:ext cx="1109212" cy="9920"/>
-            </a:xfrm>
-            <a:prstGeom prst="straightConnector1">
-              <a:avLst/>
-            </a:prstGeom>
-            <a:ln>
-              <a:tailEnd type="triangle"/>
-            </a:ln>
-          </p:spPr>
-          <p:style>
-            <a:lnRef idx="2">
-              <a:schemeClr val="dk1"/>
-            </a:lnRef>
-            <a:fillRef idx="0">
-              <a:schemeClr val="dk1"/>
-            </a:fillRef>
-            <a:effectRef idx="1">
-              <a:schemeClr val="dk1"/>
-            </a:effectRef>
-            <a:fontRef idx="minor">
-              <a:schemeClr val="tx1"/>
-            </a:fontRef>
-          </p:style>
-        </p:cxnSp>
-        <p:sp>
-          <p:nvSpPr>
-            <p:cNvPr id="49" name="Rectangle: Rounded Corners 48">
-              <a:extLst>
-                <a:ext uri="{FF2B5EF4-FFF2-40B4-BE49-F238E27FC236}">
-                  <a16:creationId xmlns:a16="http://schemas.microsoft.com/office/drawing/2014/main" id="{21AE8A23-9F82-414C-9E37-9B588B8A2467}"/>
-                </a:ext>
-              </a:extLst>
-            </p:cNvPr>
-            <p:cNvSpPr/>
-            <p:nvPr/>
-          </p:nvSpPr>
-          <p:spPr>
-            <a:xfrm>
-              <a:off x="4947966" y="1944697"/>
-              <a:ext cx="1365849" cy="615408"/>
-            </a:xfrm>
-            <a:prstGeom prst="roundRect">
-              <a:avLst/>
-            </a:prstGeom>
-          </p:spPr>
-          <p:style>
-            <a:lnRef idx="3">
-              <a:schemeClr val="lt1"/>
-            </a:lnRef>
-            <a:fillRef idx="1">
-              <a:schemeClr val="accent6"/>
-            </a:fillRef>
-            <a:effectRef idx="1">
-              <a:schemeClr val="accent6"/>
-            </a:effectRef>
-            <a:fontRef idx="minor">
-              <a:schemeClr val="lt1"/>
-            </a:fontRef>
-          </p:style>
-          <p:txBody>
-            <a:bodyPr rtlCol="0" anchor="ctr"/>
-            <a:lstStyle/>
-            <a:p>
-              <a:pPr algn="ctr"/>
-              <a:r>
-                <a:rPr lang="en-US" sz="1200" dirty="0"/>
-                <a:t>walk</a:t>
-              </a:r>
-              <a:endParaRPr lang="en-IL" sz="1200" dirty="0"/>
-            </a:p>
-          </p:txBody>
-        </p:sp>
-        <p:cxnSp>
-          <p:nvCxnSpPr>
-            <p:cNvPr id="50" name="Straight Arrow Connector 49">
-              <a:extLst>
-                <a:ext uri="{FF2B5EF4-FFF2-40B4-BE49-F238E27FC236}">
-                  <a16:creationId xmlns:a16="http://schemas.microsoft.com/office/drawing/2014/main" id="{8DB400E4-741C-45D9-AB76-0E820752292D}"/>
-                </a:ext>
-              </a:extLst>
-            </p:cNvPr>
-            <p:cNvCxnSpPr>
-              <a:stCxn id="45" idx="0"/>
-              <a:endCxn id="49" idx="2"/>
-            </p:cNvCxnSpPr>
-            <p:nvPr/>
-          </p:nvCxnSpPr>
-          <p:spPr>
-            <a:xfrm flipH="1" flipV="1">
-              <a:off x="5630891" y="2560105"/>
-              <a:ext cx="1" cy="571111"/>
-            </a:xfrm>
-            <a:prstGeom prst="straightConnector1">
-              <a:avLst/>
-            </a:prstGeom>
-            <a:ln>
-              <a:tailEnd type="triangle"/>
-            </a:ln>
-          </p:spPr>
-          <p:style>
-            <a:lnRef idx="2">
-              <a:schemeClr val="dk1"/>
-            </a:lnRef>
-            <a:fillRef idx="0">
-              <a:schemeClr val="dk1"/>
-            </a:fillRef>
-            <a:effectRef idx="1">
-              <a:schemeClr val="dk1"/>
-            </a:effectRef>
-            <a:fontRef idx="minor">
-              <a:schemeClr val="tx1"/>
-            </a:fontRef>
-          </p:style>
-        </p:cxnSp>
-      </p:grpSp>
+        </p:nvSpPr>
+        <p:spPr>
+          <a:xfrm>
+            <a:off x="4270762" y="1235525"/>
+            <a:ext cx="767544" cy="345831"/>
+          </a:xfrm>
+          <a:prstGeom prst="roundRect">
+            <a:avLst/>
+          </a:prstGeom>
+        </p:spPr>
+        <p:style>
+          <a:lnRef idx="2">
+            <a:schemeClr val="accent5">
+              <a:shade val="50000"/>
+            </a:schemeClr>
+          </a:lnRef>
+          <a:fillRef idx="1">
+            <a:schemeClr val="accent5"/>
+          </a:fillRef>
+          <a:effectRef idx="0">
+            <a:schemeClr val="accent5"/>
+          </a:effectRef>
+          <a:fontRef idx="minor">
+            <a:schemeClr val="lt1"/>
+          </a:fontRef>
+        </p:style>
+        <p:txBody>
+          <a:bodyPr rtlCol="0" anchor="ctr"/>
+          <a:lstStyle/>
+          <a:p>
+            <a:pPr algn="ctr"/>
+            <a:r>
+              <a:rPr lang="en-US" sz="1200" dirty="0"/>
+              <a:t>map</a:t>
+            </a:r>
+            <a:endParaRPr lang="en-IL" sz="1200" dirty="0"/>
+          </a:p>
+        </p:txBody>
+      </p:sp>
+      <p:sp>
+        <p:nvSpPr>
+          <p:cNvPr id="32" name="Rectangle: Rounded Corners 31">
+            <a:extLst>
+              <a:ext uri="{FF2B5EF4-FFF2-40B4-BE49-F238E27FC236}">
+                <a16:creationId xmlns:a16="http://schemas.microsoft.com/office/drawing/2014/main" id="{7D780352-89A4-4749-AD63-966654D4055F}"/>
+              </a:ext>
+            </a:extLst>
+          </p:cNvPr>
+          <p:cNvSpPr/>
+          <p:nvPr/>
+        </p:nvSpPr>
+        <p:spPr>
+          <a:xfrm>
+            <a:off x="4270762" y="1710836"/>
+            <a:ext cx="767544" cy="345831"/>
+          </a:xfrm>
+          <a:prstGeom prst="roundRect">
+            <a:avLst/>
+          </a:prstGeom>
+        </p:spPr>
+        <p:style>
+          <a:lnRef idx="2">
+            <a:schemeClr val="accent5">
+              <a:shade val="50000"/>
+            </a:schemeClr>
+          </a:lnRef>
+          <a:fillRef idx="1">
+            <a:schemeClr val="accent5"/>
+          </a:fillRef>
+          <a:effectRef idx="0">
+            <a:schemeClr val="accent5"/>
+          </a:effectRef>
+          <a:fontRef idx="minor">
+            <a:schemeClr val="lt1"/>
+          </a:fontRef>
+        </p:style>
+        <p:txBody>
+          <a:bodyPr rtlCol="0" anchor="ctr"/>
+          <a:lstStyle/>
+          <a:p>
+            <a:pPr algn="ctr"/>
+            <a:r>
+              <a:rPr lang="en-US" sz="1200" dirty="0"/>
+              <a:t>map2</a:t>
+            </a:r>
+            <a:endParaRPr lang="en-IL" sz="1200" dirty="0"/>
+          </a:p>
+        </p:txBody>
+      </p:sp>
+      <p:sp>
+        <p:nvSpPr>
+          <p:cNvPr id="33" name="Rectangle: Rounded Corners 32">
+            <a:extLst>
+              <a:ext uri="{FF2B5EF4-FFF2-40B4-BE49-F238E27FC236}">
+                <a16:creationId xmlns:a16="http://schemas.microsoft.com/office/drawing/2014/main" id="{19F25F2B-41B8-4B2E-AAE2-18AE915FE653}"/>
+              </a:ext>
+            </a:extLst>
+          </p:cNvPr>
+          <p:cNvSpPr/>
+          <p:nvPr/>
+        </p:nvSpPr>
+        <p:spPr>
+          <a:xfrm>
+            <a:off x="4270762" y="2188862"/>
+            <a:ext cx="767544" cy="345831"/>
+          </a:xfrm>
+          <a:prstGeom prst="roundRect">
+            <a:avLst/>
+          </a:prstGeom>
+        </p:spPr>
+        <p:style>
+          <a:lnRef idx="2">
+            <a:schemeClr val="accent5">
+              <a:shade val="50000"/>
+            </a:schemeClr>
+          </a:lnRef>
+          <a:fillRef idx="1">
+            <a:schemeClr val="accent5"/>
+          </a:fillRef>
+          <a:effectRef idx="0">
+            <a:schemeClr val="accent5"/>
+          </a:effectRef>
+          <a:fontRef idx="minor">
+            <a:schemeClr val="lt1"/>
+          </a:fontRef>
+        </p:style>
+        <p:txBody>
+          <a:bodyPr rtlCol="0" anchor="ctr"/>
+          <a:lstStyle/>
+          <a:p>
+            <a:pPr algn="ctr"/>
+            <a:r>
+              <a:rPr lang="en-US" sz="1200" dirty="0" err="1"/>
+              <a:t>pmap</a:t>
+            </a:r>
+            <a:endParaRPr lang="en-IL" sz="1200" dirty="0"/>
+          </a:p>
+        </p:txBody>
+      </p:sp>
+      <p:sp>
+        <p:nvSpPr>
+          <p:cNvPr id="34" name="Rectangle: Rounded Corners 33">
+            <a:extLst>
+              <a:ext uri="{FF2B5EF4-FFF2-40B4-BE49-F238E27FC236}">
+                <a16:creationId xmlns:a16="http://schemas.microsoft.com/office/drawing/2014/main" id="{2AF4D988-951A-499E-9505-60B15F02E7EE}"/>
+              </a:ext>
+            </a:extLst>
+          </p:cNvPr>
+          <p:cNvSpPr/>
+          <p:nvPr/>
+        </p:nvSpPr>
+        <p:spPr>
+          <a:xfrm>
+            <a:off x="8068263" y="2296482"/>
+            <a:ext cx="767544" cy="345831"/>
+          </a:xfrm>
+          <a:prstGeom prst="roundRect">
+            <a:avLst/>
+          </a:prstGeom>
+        </p:spPr>
+        <p:style>
+          <a:lnRef idx="2">
+            <a:schemeClr val="accent2">
+              <a:shade val="50000"/>
+            </a:schemeClr>
+          </a:lnRef>
+          <a:fillRef idx="1">
+            <a:schemeClr val="accent2"/>
+          </a:fillRef>
+          <a:effectRef idx="0">
+            <a:schemeClr val="accent2"/>
+          </a:effectRef>
+          <a:fontRef idx="minor">
+            <a:schemeClr val="lt1"/>
+          </a:fontRef>
+        </p:style>
+        <p:txBody>
+          <a:bodyPr rtlCol="0" anchor="ctr"/>
+          <a:lstStyle/>
+          <a:p>
+            <a:pPr algn="ctr"/>
+            <a:r>
+              <a:rPr lang="en-US" sz="1200" dirty="0" err="1"/>
+              <a:t>map_chr</a:t>
+            </a:r>
+            <a:endParaRPr lang="en-IL" sz="1200" dirty="0"/>
+          </a:p>
+        </p:txBody>
+      </p:sp>
+      <p:sp>
+        <p:nvSpPr>
+          <p:cNvPr id="35" name="Rectangle: Rounded Corners 34">
+            <a:extLst>
+              <a:ext uri="{FF2B5EF4-FFF2-40B4-BE49-F238E27FC236}">
+                <a16:creationId xmlns:a16="http://schemas.microsoft.com/office/drawing/2014/main" id="{B8B70F72-CC19-4CBC-915F-A451227E6F2A}"/>
+              </a:ext>
+            </a:extLst>
+          </p:cNvPr>
+          <p:cNvSpPr/>
+          <p:nvPr/>
+        </p:nvSpPr>
+        <p:spPr>
+          <a:xfrm>
+            <a:off x="8068263" y="2710132"/>
+            <a:ext cx="767544" cy="345831"/>
+          </a:xfrm>
+          <a:prstGeom prst="roundRect">
+            <a:avLst/>
+          </a:prstGeom>
+        </p:spPr>
+        <p:style>
+          <a:lnRef idx="2">
+            <a:schemeClr val="accent2">
+              <a:shade val="50000"/>
+            </a:schemeClr>
+          </a:lnRef>
+          <a:fillRef idx="1">
+            <a:schemeClr val="accent2"/>
+          </a:fillRef>
+          <a:effectRef idx="0">
+            <a:schemeClr val="accent2"/>
+          </a:effectRef>
+          <a:fontRef idx="minor">
+            <a:schemeClr val="lt1"/>
+          </a:fontRef>
+        </p:style>
+        <p:txBody>
+          <a:bodyPr rtlCol="0" anchor="ctr"/>
+          <a:lstStyle/>
+          <a:p>
+            <a:pPr algn="ctr"/>
+            <a:r>
+              <a:rPr lang="en-US" sz="1200" dirty="0" err="1"/>
+              <a:t>map_dbl</a:t>
+            </a:r>
+            <a:endParaRPr lang="en-IL" sz="1200" dirty="0"/>
+          </a:p>
+        </p:txBody>
+      </p:sp>
+      <p:sp>
+        <p:nvSpPr>
+          <p:cNvPr id="37" name="Rectangle: Rounded Corners 36">
+            <a:extLst>
+              <a:ext uri="{FF2B5EF4-FFF2-40B4-BE49-F238E27FC236}">
+                <a16:creationId xmlns:a16="http://schemas.microsoft.com/office/drawing/2014/main" id="{DC6ACE62-516D-44D9-892A-541E3AC22F3F}"/>
+              </a:ext>
+            </a:extLst>
+          </p:cNvPr>
+          <p:cNvSpPr/>
+          <p:nvPr/>
+        </p:nvSpPr>
+        <p:spPr>
+          <a:xfrm>
+            <a:off x="8984468" y="2710132"/>
+            <a:ext cx="767544" cy="345831"/>
+          </a:xfrm>
+          <a:prstGeom prst="roundRect">
+            <a:avLst/>
+          </a:prstGeom>
+        </p:spPr>
+        <p:style>
+          <a:lnRef idx="2">
+            <a:schemeClr val="accent2">
+              <a:shade val="50000"/>
+            </a:schemeClr>
+          </a:lnRef>
+          <a:fillRef idx="1">
+            <a:schemeClr val="accent2"/>
+          </a:fillRef>
+          <a:effectRef idx="0">
+            <a:schemeClr val="accent2"/>
+          </a:effectRef>
+          <a:fontRef idx="minor">
+            <a:schemeClr val="lt1"/>
+          </a:fontRef>
+        </p:style>
+        <p:txBody>
+          <a:bodyPr rtlCol="0" anchor="ctr"/>
+          <a:lstStyle/>
+          <a:p>
+            <a:pPr algn="ctr"/>
+            <a:r>
+              <a:rPr lang="en-US" sz="1200" dirty="0" err="1"/>
+              <a:t>map_int</a:t>
+            </a:r>
+            <a:endParaRPr lang="en-IL" sz="1200" dirty="0"/>
+          </a:p>
+        </p:txBody>
+      </p:sp>
+      <p:sp>
+        <p:nvSpPr>
+          <p:cNvPr id="40" name="Rectangle: Rounded Corners 39">
+            <a:extLst>
+              <a:ext uri="{FF2B5EF4-FFF2-40B4-BE49-F238E27FC236}">
+                <a16:creationId xmlns:a16="http://schemas.microsoft.com/office/drawing/2014/main" id="{A9DD05EE-86D7-4B9B-B66B-18EAFD63A683}"/>
+              </a:ext>
+            </a:extLst>
+          </p:cNvPr>
+          <p:cNvSpPr/>
+          <p:nvPr/>
+        </p:nvSpPr>
+        <p:spPr>
+          <a:xfrm>
+            <a:off x="8068263" y="3115939"/>
+            <a:ext cx="767544" cy="345831"/>
+          </a:xfrm>
+          <a:prstGeom prst="roundRect">
+            <a:avLst/>
+          </a:prstGeom>
+        </p:spPr>
+        <p:style>
+          <a:lnRef idx="2">
+            <a:schemeClr val="accent2">
+              <a:shade val="50000"/>
+            </a:schemeClr>
+          </a:lnRef>
+          <a:fillRef idx="1">
+            <a:schemeClr val="accent2"/>
+          </a:fillRef>
+          <a:effectRef idx="0">
+            <a:schemeClr val="accent2"/>
+          </a:effectRef>
+          <a:fontRef idx="minor">
+            <a:schemeClr val="lt1"/>
+          </a:fontRef>
+        </p:style>
+        <p:txBody>
+          <a:bodyPr rtlCol="0" anchor="ctr"/>
+          <a:lstStyle/>
+          <a:p>
+            <a:pPr algn="ctr"/>
+            <a:r>
+              <a:rPr lang="en-US" sz="1200" dirty="0" err="1"/>
+              <a:t>map_lgl</a:t>
+            </a:r>
+            <a:endParaRPr lang="en-IL" sz="1200" dirty="0"/>
+          </a:p>
+        </p:txBody>
+      </p:sp>
+      <p:sp>
+        <p:nvSpPr>
+          <p:cNvPr id="41" name="Rectangle: Rounded Corners 40">
+            <a:extLst>
+              <a:ext uri="{FF2B5EF4-FFF2-40B4-BE49-F238E27FC236}">
+                <a16:creationId xmlns:a16="http://schemas.microsoft.com/office/drawing/2014/main" id="{619F90B0-4E65-4EE5-994C-1D02907C8181}"/>
+              </a:ext>
+            </a:extLst>
+          </p:cNvPr>
+          <p:cNvSpPr/>
+          <p:nvPr/>
+        </p:nvSpPr>
+        <p:spPr>
+          <a:xfrm>
+            <a:off x="8998055" y="3112484"/>
+            <a:ext cx="767544" cy="345831"/>
+          </a:xfrm>
+          <a:prstGeom prst="roundRect">
+            <a:avLst/>
+          </a:prstGeom>
+        </p:spPr>
+        <p:style>
+          <a:lnRef idx="2">
+            <a:schemeClr val="accent2">
+              <a:shade val="50000"/>
+            </a:schemeClr>
+          </a:lnRef>
+          <a:fillRef idx="1">
+            <a:schemeClr val="accent2"/>
+          </a:fillRef>
+          <a:effectRef idx="0">
+            <a:schemeClr val="accent2"/>
+          </a:effectRef>
+          <a:fontRef idx="minor">
+            <a:schemeClr val="lt1"/>
+          </a:fontRef>
+        </p:style>
+        <p:txBody>
+          <a:bodyPr rtlCol="0" anchor="ctr"/>
+          <a:lstStyle/>
+          <a:p>
+            <a:pPr algn="ctr"/>
+            <a:r>
+              <a:rPr lang="en-US" sz="1200" dirty="0" err="1"/>
+              <a:t>map_df</a:t>
+            </a:r>
+            <a:endParaRPr lang="en-IL" sz="1200" dirty="0"/>
+          </a:p>
+        </p:txBody>
+      </p:sp>
+      <p:sp>
+        <p:nvSpPr>
+          <p:cNvPr id="42" name="Rectangle: Rounded Corners 41">
+            <a:extLst>
+              <a:ext uri="{FF2B5EF4-FFF2-40B4-BE49-F238E27FC236}">
+                <a16:creationId xmlns:a16="http://schemas.microsoft.com/office/drawing/2014/main" id="{4DFA2E1B-1F51-41D1-A551-DE96B50F9D1E}"/>
+              </a:ext>
+            </a:extLst>
+          </p:cNvPr>
+          <p:cNvSpPr/>
+          <p:nvPr/>
+        </p:nvSpPr>
+        <p:spPr>
+          <a:xfrm>
+            <a:off x="5638606" y="2574396"/>
+            <a:ext cx="930748" cy="345831"/>
+          </a:xfrm>
+          <a:prstGeom prst="roundRect">
+            <a:avLst/>
+          </a:prstGeom>
+        </p:spPr>
+        <p:style>
+          <a:lnRef idx="2">
+            <a:schemeClr val="accent1">
+              <a:shade val="50000"/>
+            </a:schemeClr>
+          </a:lnRef>
+          <a:fillRef idx="1">
+            <a:schemeClr val="accent1"/>
+          </a:fillRef>
+          <a:effectRef idx="0">
+            <a:schemeClr val="accent1"/>
+          </a:effectRef>
+          <a:fontRef idx="minor">
+            <a:schemeClr val="lt1"/>
+          </a:fontRef>
+        </p:style>
+        <p:txBody>
+          <a:bodyPr rtlCol="0" anchor="ctr"/>
+          <a:lstStyle/>
+          <a:p>
+            <a:pPr algn="ctr"/>
+            <a:r>
+              <a:rPr lang="en-US" sz="1200" dirty="0"/>
+              <a:t>function(x) x</a:t>
+            </a:r>
+            <a:endParaRPr lang="en-IL" sz="1200" dirty="0"/>
+          </a:p>
+        </p:txBody>
+      </p:sp>
+      <p:sp>
+        <p:nvSpPr>
+          <p:cNvPr id="43" name="Rectangle: Rounded Corners 42">
+            <a:extLst>
+              <a:ext uri="{FF2B5EF4-FFF2-40B4-BE49-F238E27FC236}">
+                <a16:creationId xmlns:a16="http://schemas.microsoft.com/office/drawing/2014/main" id="{94420D02-C9E3-4E43-BC92-DA1E115CE800}"/>
+              </a:ext>
+            </a:extLst>
+          </p:cNvPr>
+          <p:cNvSpPr/>
+          <p:nvPr/>
+        </p:nvSpPr>
+        <p:spPr>
+          <a:xfrm>
+            <a:off x="6686506" y="2574396"/>
+            <a:ext cx="499304" cy="345831"/>
+          </a:xfrm>
+          <a:prstGeom prst="roundRect">
+            <a:avLst/>
+          </a:prstGeom>
+        </p:spPr>
+        <p:style>
+          <a:lnRef idx="2">
+            <a:schemeClr val="accent1">
+              <a:shade val="50000"/>
+            </a:schemeClr>
+          </a:lnRef>
+          <a:fillRef idx="1">
+            <a:schemeClr val="accent1"/>
+          </a:fillRef>
+          <a:effectRef idx="0">
+            <a:schemeClr val="accent1"/>
+          </a:effectRef>
+          <a:fontRef idx="minor">
+            <a:schemeClr val="lt1"/>
+          </a:fontRef>
+        </p:style>
+        <p:txBody>
+          <a:bodyPr rtlCol="0" anchor="ctr"/>
+          <a:lstStyle/>
+          <a:p>
+            <a:pPr algn="ctr"/>
+            <a:r>
+              <a:rPr lang="en-US" sz="1200" dirty="0"/>
+              <a:t>~ .x</a:t>
+            </a:r>
+            <a:endParaRPr lang="en-IL" sz="1200" dirty="0"/>
+          </a:p>
+        </p:txBody>
+      </p:sp>
+      <p:sp>
+        <p:nvSpPr>
+          <p:cNvPr id="44" name="Rectangle: Rounded Corners 43">
+            <a:extLst>
+              <a:ext uri="{FF2B5EF4-FFF2-40B4-BE49-F238E27FC236}">
+                <a16:creationId xmlns:a16="http://schemas.microsoft.com/office/drawing/2014/main" id="{E42EE89D-B566-4D81-9F3A-89F64B69398B}"/>
+              </a:ext>
+            </a:extLst>
+          </p:cNvPr>
+          <p:cNvSpPr/>
+          <p:nvPr/>
+        </p:nvSpPr>
+        <p:spPr>
+          <a:xfrm>
+            <a:off x="5638607" y="3023821"/>
+            <a:ext cx="1547190" cy="345831"/>
+          </a:xfrm>
+          <a:prstGeom prst="roundRect">
+            <a:avLst/>
+          </a:prstGeom>
+        </p:spPr>
+        <p:style>
+          <a:lnRef idx="2">
+            <a:schemeClr val="accent1">
+              <a:shade val="50000"/>
+            </a:schemeClr>
+          </a:lnRef>
+          <a:fillRef idx="1">
+            <a:schemeClr val="accent1"/>
+          </a:fillRef>
+          <a:effectRef idx="0">
+            <a:schemeClr val="accent1"/>
+          </a:effectRef>
+          <a:fontRef idx="minor">
+            <a:schemeClr val="lt1"/>
+          </a:fontRef>
+        </p:style>
+        <p:txBody>
+          <a:bodyPr rtlCol="0" anchor="ctr"/>
+          <a:lstStyle/>
+          <a:p>
+            <a:pPr algn="ctr"/>
+            <a:r>
+              <a:rPr lang="en-US" sz="1200" dirty="0" err="1"/>
+              <a:t>my_func</a:t>
+            </a:r>
+            <a:r>
+              <a:rPr lang="en-US" sz="1200" dirty="0"/>
+              <a:t> &lt;- function(x) {x}</a:t>
+            </a:r>
+            <a:endParaRPr lang="en-IL" sz="1200" dirty="0"/>
+          </a:p>
+        </p:txBody>
+      </p:sp>
+      <p:sp>
+        <p:nvSpPr>
+          <p:cNvPr id="45" name="Rectangle: Rounded Corners 44">
+            <a:extLst>
+              <a:ext uri="{FF2B5EF4-FFF2-40B4-BE49-F238E27FC236}">
+                <a16:creationId xmlns:a16="http://schemas.microsoft.com/office/drawing/2014/main" id="{9591BCB6-B030-4FB3-8656-5F68610FCEC7}"/>
+              </a:ext>
+            </a:extLst>
+          </p:cNvPr>
+          <p:cNvSpPr/>
+          <p:nvPr/>
+        </p:nvSpPr>
+        <p:spPr>
+          <a:xfrm>
+            <a:off x="6185582" y="1566573"/>
+            <a:ext cx="767544" cy="345831"/>
+          </a:xfrm>
+          <a:prstGeom prst="roundRect">
+            <a:avLst/>
+          </a:prstGeom>
+        </p:spPr>
+        <p:style>
+          <a:lnRef idx="2">
+            <a:schemeClr val="dk1">
+              <a:shade val="50000"/>
+            </a:schemeClr>
+          </a:lnRef>
+          <a:fillRef idx="1">
+            <a:schemeClr val="dk1"/>
+          </a:fillRef>
+          <a:effectRef idx="0">
+            <a:schemeClr val="dk1"/>
+          </a:effectRef>
+          <a:fontRef idx="minor">
+            <a:schemeClr val="lt1"/>
+          </a:fontRef>
+        </p:style>
+        <p:txBody>
+          <a:bodyPr rtlCol="0" anchor="ctr"/>
+          <a:lstStyle/>
+          <a:p>
+            <a:pPr algn="ctr"/>
+            <a:r>
+              <a:rPr lang="en-US" sz="1200" dirty="0" err="1"/>
+              <a:t>purrr</a:t>
+            </a:r>
+            <a:endParaRPr lang="en-IL" sz="1200" dirty="0"/>
+          </a:p>
+        </p:txBody>
+      </p:sp>
+      <p:cxnSp>
+        <p:nvCxnSpPr>
+          <p:cNvPr id="46" name="Straight Arrow Connector 45">
+            <a:extLst>
+              <a:ext uri="{FF2B5EF4-FFF2-40B4-BE49-F238E27FC236}">
+                <a16:creationId xmlns:a16="http://schemas.microsoft.com/office/drawing/2014/main" id="{9E8CA312-DEB4-4423-93C5-585287C0C2F0}"/>
+              </a:ext>
+            </a:extLst>
+          </p:cNvPr>
+          <p:cNvCxnSpPr>
+            <a:cxnSpLocks/>
+            <a:stCxn id="45" idx="3"/>
+          </p:cNvCxnSpPr>
+          <p:nvPr/>
+        </p:nvCxnSpPr>
+        <p:spPr>
+          <a:xfrm>
+            <a:off x="6953126" y="1739489"/>
+            <a:ext cx="1002734" cy="255117"/>
+          </a:xfrm>
+          <a:prstGeom prst="straightConnector1">
+            <a:avLst/>
+          </a:prstGeom>
+          <a:ln>
+            <a:tailEnd type="triangle"/>
+          </a:ln>
+        </p:spPr>
+        <p:style>
+          <a:lnRef idx="2">
+            <a:schemeClr val="dk1"/>
+          </a:lnRef>
+          <a:fillRef idx="0">
+            <a:schemeClr val="dk1"/>
+          </a:fillRef>
+          <a:effectRef idx="1">
+            <a:schemeClr val="dk1"/>
+          </a:effectRef>
+          <a:fontRef idx="minor">
+            <a:schemeClr val="tx1"/>
+          </a:fontRef>
+        </p:style>
+      </p:cxnSp>
+      <p:cxnSp>
+        <p:nvCxnSpPr>
+          <p:cNvPr id="47" name="Straight Arrow Connector 46">
+            <a:extLst>
+              <a:ext uri="{FF2B5EF4-FFF2-40B4-BE49-F238E27FC236}">
+                <a16:creationId xmlns:a16="http://schemas.microsoft.com/office/drawing/2014/main" id="{32949EDF-A173-4DB6-B2D9-2ABD491F65CF}"/>
+              </a:ext>
+            </a:extLst>
+          </p:cNvPr>
+          <p:cNvCxnSpPr>
+            <a:stCxn id="45" idx="2"/>
+          </p:cNvCxnSpPr>
+          <p:nvPr/>
+        </p:nvCxnSpPr>
+        <p:spPr>
+          <a:xfrm flipH="1">
+            <a:off x="6569354" y="1912404"/>
+            <a:ext cx="1" cy="282340"/>
+          </a:xfrm>
+          <a:prstGeom prst="straightConnector1">
+            <a:avLst/>
+          </a:prstGeom>
+          <a:ln>
+            <a:tailEnd type="triangle"/>
+          </a:ln>
+        </p:spPr>
+        <p:style>
+          <a:lnRef idx="2">
+            <a:schemeClr val="dk1"/>
+          </a:lnRef>
+          <a:fillRef idx="0">
+            <a:schemeClr val="dk1"/>
+          </a:fillRef>
+          <a:effectRef idx="1">
+            <a:schemeClr val="dk1"/>
+          </a:effectRef>
+          <a:fontRef idx="minor">
+            <a:schemeClr val="tx1"/>
+          </a:fontRef>
+        </p:style>
+      </p:cxnSp>
+      <p:cxnSp>
+        <p:nvCxnSpPr>
+          <p:cNvPr id="48" name="Straight Arrow Connector 47">
+            <a:extLst>
+              <a:ext uri="{FF2B5EF4-FFF2-40B4-BE49-F238E27FC236}">
+                <a16:creationId xmlns:a16="http://schemas.microsoft.com/office/drawing/2014/main" id="{A4E13822-0100-4325-88A2-6D243838F3BE}"/>
+              </a:ext>
+            </a:extLst>
+          </p:cNvPr>
+          <p:cNvCxnSpPr>
+            <a:cxnSpLocks/>
+            <a:stCxn id="45" idx="1"/>
+          </p:cNvCxnSpPr>
+          <p:nvPr/>
+        </p:nvCxnSpPr>
+        <p:spPr>
+          <a:xfrm flipH="1">
+            <a:off x="5175849" y="1739489"/>
+            <a:ext cx="1009733" cy="189713"/>
+          </a:xfrm>
+          <a:prstGeom prst="straightConnector1">
+            <a:avLst/>
+          </a:prstGeom>
+          <a:ln>
+            <a:tailEnd type="triangle"/>
+          </a:ln>
+        </p:spPr>
+        <p:style>
+          <a:lnRef idx="2">
+            <a:schemeClr val="dk1"/>
+          </a:lnRef>
+          <a:fillRef idx="0">
+            <a:schemeClr val="dk1"/>
+          </a:fillRef>
+          <a:effectRef idx="1">
+            <a:schemeClr val="dk1"/>
+          </a:effectRef>
+          <a:fontRef idx="minor">
+            <a:schemeClr val="tx1"/>
+          </a:fontRef>
+        </p:style>
+      </p:cxnSp>
+      <p:sp>
+        <p:nvSpPr>
+          <p:cNvPr id="49" name="Rectangle: Rounded Corners 48">
+            <a:extLst>
+              <a:ext uri="{FF2B5EF4-FFF2-40B4-BE49-F238E27FC236}">
+                <a16:creationId xmlns:a16="http://schemas.microsoft.com/office/drawing/2014/main" id="{21AE8A23-9F82-414C-9E37-9B588B8A2467}"/>
+              </a:ext>
+            </a:extLst>
+          </p:cNvPr>
+          <p:cNvSpPr/>
+          <p:nvPr/>
+        </p:nvSpPr>
+        <p:spPr>
+          <a:xfrm>
+            <a:off x="8984468" y="2296482"/>
+            <a:ext cx="767544" cy="345831"/>
+          </a:xfrm>
+          <a:prstGeom prst="roundRect">
+            <a:avLst/>
+          </a:prstGeom>
+        </p:spPr>
+        <p:style>
+          <a:lnRef idx="3">
+            <a:schemeClr val="lt1"/>
+          </a:lnRef>
+          <a:fillRef idx="1">
+            <a:schemeClr val="accent6"/>
+          </a:fillRef>
+          <a:effectRef idx="1">
+            <a:schemeClr val="accent6"/>
+          </a:effectRef>
+          <a:fontRef idx="minor">
+            <a:schemeClr val="lt1"/>
+          </a:fontRef>
+        </p:style>
+        <p:txBody>
+          <a:bodyPr rtlCol="0" anchor="ctr"/>
+          <a:lstStyle/>
+          <a:p>
+            <a:pPr algn="ctr"/>
+            <a:r>
+              <a:rPr lang="en-US" sz="1200" dirty="0"/>
+              <a:t>walk</a:t>
+            </a:r>
+            <a:endParaRPr lang="en-IL" sz="1200" dirty="0"/>
+          </a:p>
+        </p:txBody>
+      </p:sp>
       <p:sp>
         <p:nvSpPr>
           <p:cNvPr id="51" name="TextBox 50">
@@ -4842,6 +4781,208 @@
               <a:t>chapter 21. https://r4ds.had.co.nz (fetched 2019-06-11)</a:t>
             </a:r>
             <a:endParaRPr lang="en-IL" sz="1600" dirty="0"/>
+          </a:p>
+        </p:txBody>
+      </p:sp>
+      <p:sp>
+        <p:nvSpPr>
+          <p:cNvPr id="53" name="Rectangle: Rounded Corners 52">
+            <a:extLst>
+              <a:ext uri="{FF2B5EF4-FFF2-40B4-BE49-F238E27FC236}">
+                <a16:creationId xmlns:a16="http://schemas.microsoft.com/office/drawing/2014/main" id="{50B21368-391D-4B24-A73F-2A6E3FB4F15D}"/>
+              </a:ext>
+            </a:extLst>
+          </p:cNvPr>
+          <p:cNvSpPr/>
+          <p:nvPr/>
+        </p:nvSpPr>
+        <p:spPr>
+          <a:xfrm>
+            <a:off x="7045906" y="778952"/>
+            <a:ext cx="1088804" cy="442544"/>
+          </a:xfrm>
+          <a:prstGeom prst="roundRect">
+            <a:avLst/>
+          </a:prstGeom>
+        </p:spPr>
+        <p:style>
+          <a:lnRef idx="3">
+            <a:schemeClr val="lt1"/>
+          </a:lnRef>
+          <a:fillRef idx="1">
+            <a:schemeClr val="accent3"/>
+          </a:fillRef>
+          <a:effectRef idx="1">
+            <a:schemeClr val="accent3"/>
+          </a:effectRef>
+          <a:fontRef idx="minor">
+            <a:schemeClr val="lt1"/>
+          </a:fontRef>
+        </p:style>
+        <p:txBody>
+          <a:bodyPr rtlCol="0" anchor="ctr"/>
+          <a:lstStyle/>
+          <a:p>
+            <a:pPr algn="ctr"/>
+            <a:r>
+              <a:rPr lang="en-US" sz="1200" dirty="0"/>
+              <a:t>What is a functional?</a:t>
+            </a:r>
+            <a:endParaRPr lang="en-IL" sz="1200" dirty="0"/>
+          </a:p>
+        </p:txBody>
+      </p:sp>
+      <p:cxnSp>
+        <p:nvCxnSpPr>
+          <p:cNvPr id="19" name="Straight Arrow Connector 18">
+            <a:extLst>
+              <a:ext uri="{FF2B5EF4-FFF2-40B4-BE49-F238E27FC236}">
+                <a16:creationId xmlns:a16="http://schemas.microsoft.com/office/drawing/2014/main" id="{7E37D132-5AD4-467D-A4EA-8F6E36F7AA44}"/>
+              </a:ext>
+            </a:extLst>
+          </p:cNvPr>
+          <p:cNvCxnSpPr>
+            <a:cxnSpLocks/>
+            <a:stCxn id="53" idx="2"/>
+            <a:endCxn id="45" idx="0"/>
+          </p:cNvCxnSpPr>
+          <p:nvPr/>
+        </p:nvCxnSpPr>
+        <p:spPr>
+          <a:xfrm flipH="1">
+            <a:off x="6569354" y="1221496"/>
+            <a:ext cx="1020954" cy="345077"/>
+          </a:xfrm>
+          <a:prstGeom prst="straightConnector1">
+            <a:avLst/>
+          </a:prstGeom>
+          <a:ln>
+            <a:solidFill>
+              <a:schemeClr val="tx1"/>
+            </a:solidFill>
+            <a:tailEnd type="triangle"/>
+          </a:ln>
+        </p:spPr>
+        <p:style>
+          <a:lnRef idx="1">
+            <a:schemeClr val="accent1"/>
+          </a:lnRef>
+          <a:fillRef idx="0">
+            <a:schemeClr val="accent1"/>
+          </a:fillRef>
+          <a:effectRef idx="0">
+            <a:schemeClr val="accent1"/>
+          </a:effectRef>
+          <a:fontRef idx="minor">
+            <a:schemeClr val="tx1"/>
+          </a:fontRef>
+        </p:style>
+      </p:cxnSp>
+      <p:sp>
+        <p:nvSpPr>
+          <p:cNvPr id="56" name="TextBox 55">
+            <a:extLst>
+              <a:ext uri="{FF2B5EF4-FFF2-40B4-BE49-F238E27FC236}">
+                <a16:creationId xmlns:a16="http://schemas.microsoft.com/office/drawing/2014/main" id="{76A3AD93-0710-4E3B-9F40-BAA6FE28A44D}"/>
+              </a:ext>
+            </a:extLst>
+          </p:cNvPr>
+          <p:cNvSpPr txBox="1"/>
+          <p:nvPr/>
+        </p:nvSpPr>
+        <p:spPr>
+          <a:xfrm>
+            <a:off x="5202146" y="1372352"/>
+            <a:ext cx="930245" cy="461665"/>
+          </a:xfrm>
+          <a:prstGeom prst="rect">
+            <a:avLst/>
+          </a:prstGeom>
+          <a:noFill/>
+        </p:spPr>
+        <p:txBody>
+          <a:bodyPr wrap="square" rtlCol="0">
+            <a:spAutoFit/>
+          </a:bodyPr>
+          <a:lstStyle/>
+          <a:p>
+            <a:r>
+              <a:rPr lang="en-US" sz="1200" dirty="0"/>
+              <a:t>iterating on objects</a:t>
+            </a:r>
+            <a:endParaRPr lang="en-IL" sz="1200" dirty="0"/>
+          </a:p>
+        </p:txBody>
+      </p:sp>
+      <p:sp>
+        <p:nvSpPr>
+          <p:cNvPr id="59" name="TextBox 58">
+            <a:extLst>
+              <a:ext uri="{FF2B5EF4-FFF2-40B4-BE49-F238E27FC236}">
+                <a16:creationId xmlns:a16="http://schemas.microsoft.com/office/drawing/2014/main" id="{9360B122-E673-4C07-8864-2E708BC8949F}"/>
+              </a:ext>
+            </a:extLst>
+          </p:cNvPr>
+          <p:cNvSpPr txBox="1"/>
+          <p:nvPr/>
+        </p:nvSpPr>
+        <p:spPr>
+          <a:xfrm>
+            <a:off x="5742389" y="2211610"/>
+            <a:ext cx="1612936" cy="276999"/>
+          </a:xfrm>
+          <a:prstGeom prst="rect">
+            <a:avLst/>
+          </a:prstGeom>
+          <a:noFill/>
+        </p:spPr>
+        <p:txBody>
+          <a:bodyPr wrap="square" rtlCol="0">
+            <a:spAutoFit/>
+          </a:bodyPr>
+          <a:lstStyle/>
+          <a:p>
+            <a:r>
+              <a:rPr lang="en-US" sz="1200" dirty="0"/>
+              <a:t>customizing functions</a:t>
+            </a:r>
+            <a:endParaRPr lang="en-IL" sz="1200" dirty="0"/>
+          </a:p>
+        </p:txBody>
+      </p:sp>
+      <p:sp>
+        <p:nvSpPr>
+          <p:cNvPr id="62" name="TextBox 61">
+            <a:extLst>
+              <a:ext uri="{FF2B5EF4-FFF2-40B4-BE49-F238E27FC236}">
+                <a16:creationId xmlns:a16="http://schemas.microsoft.com/office/drawing/2014/main" id="{AF880335-5B0C-4572-85F5-D3837042B4DD}"/>
+              </a:ext>
+            </a:extLst>
+          </p:cNvPr>
+          <p:cNvSpPr txBox="1"/>
+          <p:nvPr/>
+        </p:nvSpPr>
+        <p:spPr>
+          <a:xfrm>
+            <a:off x="8029339" y="1935459"/>
+            <a:ext cx="1612936" cy="276999"/>
+          </a:xfrm>
+          <a:prstGeom prst="rect">
+            <a:avLst/>
+          </a:prstGeom>
+          <a:noFill/>
+        </p:spPr>
+        <p:txBody>
+          <a:bodyPr wrap="square" rtlCol="0">
+            <a:spAutoFit/>
+          </a:bodyPr>
+          <a:lstStyle/>
+          <a:p>
+            <a:r>
+              <a:rPr lang="en-US" sz="1200" dirty="0"/>
+              <a:t>returned objects</a:t>
+            </a:r>
+            <a:endParaRPr lang="en-IL" sz="1200" dirty="0"/>
           </a:p>
         </p:txBody>
       </p:sp>

</xml_diff>